<commit_message>
Presentation with embedded font.
</commit_message>
<xml_diff>
--- a/Documentation/GameFifteenPresentation.pptx
+++ b/Documentation/GameFifteenPresentation.pptx
@@ -1,6 +1,6 @@
 
 <file path=ppt/presentation.xml><?xml version="1.0" encoding="utf-8"?>
-<p:presentation xmlns:a="http://schemas.openxmlformats.org/drawingml/2006/main" xmlns:r="http://schemas.openxmlformats.org/officeDocument/2006/relationships" xmlns:p="http://schemas.openxmlformats.org/presentationml/2006/main" autoCompressPictures="0">
+<p:presentation xmlns:a="http://schemas.openxmlformats.org/drawingml/2006/main" xmlns:r="http://schemas.openxmlformats.org/officeDocument/2006/relationships" xmlns:p="http://schemas.openxmlformats.org/presentationml/2006/main" embedTrueTypeFonts="1" autoCompressPictures="0">
   <p:sldMasterIdLst>
     <p:sldMasterId id="2147483648" r:id="rId1"/>
   </p:sldMasterIdLst>
@@ -25,6 +25,24 @@
   </p:sldIdLst>
   <p:sldSz cx="12192000" cy="6858000"/>
   <p:notesSz cx="6858000" cy="9144000"/>
+  <p:embeddedFontLst>
+    <p:embeddedFont>
+      <p:font typeface="Century Gothic" panose="020B0502020202020204" pitchFamily="34" charset="0"/>
+      <p:regular r:id="rId19"/>
+      <p:bold r:id="rId20"/>
+      <p:italic r:id="rId21"/>
+      <p:boldItalic r:id="rId22"/>
+    </p:embeddedFont>
+    <p:embeddedFont>
+      <p:font typeface="South Park" panose="020B0A04020102020204" pitchFamily="34" charset="0"/>
+      <p:regular r:id="rId23"/>
+    </p:embeddedFont>
+    <p:embeddedFont>
+      <p:font typeface="Adobe Gurmukhi" panose="01010101010101010101" pitchFamily="50" charset="0"/>
+      <p:regular r:id="rId24"/>
+      <p:bold r:id="rId25"/>
+    </p:embeddedFont>
+  </p:embeddedFontLst>
   <p:defaultTextStyle>
     <a:defPPr>
       <a:defRPr lang="en-US"/>
@@ -120,6 +138,11 @@
       </a:defRPr>
     </a:lvl9pPr>
   </p:defaultTextStyle>
+  <p:extLst>
+    <p:ext uri="{EFAFB233-063F-42B5-8137-9DF3F51BA10A}">
+      <p15:sldGuideLst xmlns:p15="http://schemas.microsoft.com/office/powerpoint/2012/main"/>
+    </p:ext>
+  </p:extLst>
 </p:presentation>
 </file>
 
@@ -337,7 +360,7 @@
             <a:fld id="{B61BEF0D-F0BB-DE4B-95CE-6DB70DBA9567}" type="datetimeFigureOut">
               <a:rPr lang="en-US" dirty="0"/>
               <a:pPr/>
-              <a:t>11/10/15</a:t>
+              <a:t>12/10/15</a:t>
             </a:fld>
             <a:endParaRPr lang="en-US" dirty="0"/>
           </a:p>
@@ -625,7 +648,7 @@
             <a:fld id="{B61BEF0D-F0BB-DE4B-95CE-6DB70DBA9567}" type="datetimeFigureOut">
               <a:rPr lang="en-US" dirty="0"/>
               <a:pPr/>
-              <a:t>11/10/15</a:t>
+              <a:t>12/10/15</a:t>
             </a:fld>
             <a:endParaRPr lang="en-US" dirty="0"/>
           </a:p>
@@ -881,7 +904,7 @@
             <a:fld id="{B61BEF0D-F0BB-DE4B-95CE-6DB70DBA9567}" type="datetimeFigureOut">
               <a:rPr lang="en-US" dirty="0"/>
               <a:pPr/>
-              <a:t>11/10/15</a:t>
+              <a:t>12/10/15</a:t>
             </a:fld>
             <a:endParaRPr lang="en-US" dirty="0"/>
           </a:p>
@@ -1347,7 +1370,7 @@
             <a:fld id="{B61BEF0D-F0BB-DE4B-95CE-6DB70DBA9567}" type="datetimeFigureOut">
               <a:rPr lang="en-US" dirty="0"/>
               <a:pPr/>
-              <a:t>11/10/15</a:t>
+              <a:t>12/10/15</a:t>
             </a:fld>
             <a:endParaRPr lang="en-US" dirty="0"/>
           </a:p>
@@ -1524,7 +1547,7 @@
             <a:fld id="{B61BEF0D-F0BB-DE4B-95CE-6DB70DBA9567}" type="datetimeFigureOut">
               <a:rPr lang="en-US" dirty="0"/>
               <a:pPr/>
-              <a:t>11/10/15</a:t>
+              <a:t>12/10/15</a:t>
             </a:fld>
             <a:endParaRPr lang="en-US" dirty="0"/>
           </a:p>
@@ -2097,7 +2120,7 @@
             <a:fld id="{B61BEF0D-F0BB-DE4B-95CE-6DB70DBA9567}" type="datetimeFigureOut">
               <a:rPr lang="en-US" dirty="0"/>
               <a:pPr/>
-              <a:t>11/10/15</a:t>
+              <a:t>12/10/15</a:t>
             </a:fld>
             <a:endParaRPr lang="en-US" dirty="0"/>
           </a:p>
@@ -2426,7 +2449,7 @@
             <a:fld id="{B61BEF0D-F0BB-DE4B-95CE-6DB70DBA9567}" type="datetimeFigureOut">
               <a:rPr lang="en-US" dirty="0"/>
               <a:pPr/>
-              <a:t>11/10/15</a:t>
+              <a:t>12/10/15</a:t>
             </a:fld>
             <a:endParaRPr lang="en-US" dirty="0"/>
           </a:p>
@@ -2598,7 +2621,7 @@
             <a:fld id="{B61BEF0D-F0BB-DE4B-95CE-6DB70DBA9567}" type="datetimeFigureOut">
               <a:rPr lang="en-US" dirty="0"/>
               <a:pPr/>
-              <a:t>11/10/15</a:t>
+              <a:t>12/10/15</a:t>
             </a:fld>
             <a:endParaRPr lang="en-US" dirty="0"/>
           </a:p>
@@ -2775,7 +2798,7 @@
             <a:fld id="{B61BEF0D-F0BB-DE4B-95CE-6DB70DBA9567}" type="datetimeFigureOut">
               <a:rPr lang="en-US" dirty="0"/>
               <a:pPr/>
-              <a:t>11/10/15</a:t>
+              <a:t>12/10/15</a:t>
             </a:fld>
             <a:endParaRPr lang="en-US" dirty="0"/>
           </a:p>
@@ -2942,7 +2965,7 @@
             <a:fld id="{B61BEF0D-F0BB-DE4B-95CE-6DB70DBA9567}" type="datetimeFigureOut">
               <a:rPr lang="en-US" dirty="0"/>
               <a:pPr/>
-              <a:t>11/10/15</a:t>
+              <a:t>12/10/15</a:t>
             </a:fld>
             <a:endParaRPr lang="en-US" dirty="0"/>
           </a:p>
@@ -3196,7 +3219,7 @@
             <a:fld id="{B61BEF0D-F0BB-DE4B-95CE-6DB70DBA9567}" type="datetimeFigureOut">
               <a:rPr lang="en-US" dirty="0"/>
               <a:pPr/>
-              <a:t>11/10/15</a:t>
+              <a:t>12/10/15</a:t>
             </a:fld>
             <a:endParaRPr lang="en-US" dirty="0"/>
           </a:p>
@@ -3485,7 +3508,7 @@
             <a:fld id="{B61BEF0D-F0BB-DE4B-95CE-6DB70DBA9567}" type="datetimeFigureOut">
               <a:rPr lang="en-US" dirty="0"/>
               <a:pPr/>
-              <a:t>11/10/15</a:t>
+              <a:t>12/10/15</a:t>
             </a:fld>
             <a:endParaRPr lang="en-US" dirty="0"/>
           </a:p>
@@ -3912,7 +3935,7 @@
             <a:fld id="{B61BEF0D-F0BB-DE4B-95CE-6DB70DBA9567}" type="datetimeFigureOut">
               <a:rPr lang="en-US" dirty="0"/>
               <a:pPr/>
-              <a:t>11/10/15</a:t>
+              <a:t>12/10/15</a:t>
             </a:fld>
             <a:endParaRPr lang="en-US" dirty="0"/>
           </a:p>
@@ -4027,7 +4050,7 @@
             <a:fld id="{B61BEF0D-F0BB-DE4B-95CE-6DB70DBA9567}" type="datetimeFigureOut">
               <a:rPr lang="en-US" dirty="0"/>
               <a:pPr/>
-              <a:t>11/10/15</a:t>
+              <a:t>12/10/15</a:t>
             </a:fld>
             <a:endParaRPr lang="en-US" dirty="0"/>
           </a:p>
@@ -4119,7 +4142,7 @@
             <a:fld id="{B61BEF0D-F0BB-DE4B-95CE-6DB70DBA9567}" type="datetimeFigureOut">
               <a:rPr lang="en-US" dirty="0"/>
               <a:pPr/>
-              <a:t>11/10/15</a:t>
+              <a:t>12/10/15</a:t>
             </a:fld>
             <a:endParaRPr lang="en-US" dirty="0"/>
           </a:p>
@@ -4399,7 +4422,7 @@
             <a:fld id="{B61BEF0D-F0BB-DE4B-95CE-6DB70DBA9567}" type="datetimeFigureOut">
               <a:rPr lang="en-US" dirty="0"/>
               <a:pPr/>
-              <a:t>11/10/15</a:t>
+              <a:t>12/10/15</a:t>
             </a:fld>
             <a:endParaRPr lang="en-US" dirty="0"/>
           </a:p>
@@ -4687,7 +4710,7 @@
             <a:fld id="{B61BEF0D-F0BB-DE4B-95CE-6DB70DBA9567}" type="datetimeFigureOut">
               <a:rPr lang="en-US" dirty="0"/>
               <a:pPr/>
-              <a:t>11/10/15</a:t>
+              <a:t>12/10/15</a:t>
             </a:fld>
             <a:endParaRPr lang="en-US" dirty="0"/>
           </a:p>
@@ -4915,7 +4938,7 @@
             <a:fld id="{B61BEF0D-F0BB-DE4B-95CE-6DB70DBA9567}" type="datetimeFigureOut">
               <a:rPr lang="en-US" dirty="0"/>
               <a:pPr/>
-              <a:t>11/10/15</a:t>
+              <a:t>12/10/15</a:t>
             </a:fld>
             <a:endParaRPr lang="en-US" dirty="0"/>
           </a:p>
@@ -5752,13 +5775,13 @@
   <p:clrMapOvr>
     <a:masterClrMapping/>
   </p:clrMapOvr>
-  <mc:AlternateContent xmlns:mc="http://schemas.openxmlformats.org/markup-compatibility/2006">
-    <mc:Choice xmlns:p14="http://schemas.microsoft.com/office/powerpoint/2010/main" Requires="p14">
+  <mc:AlternateContent xmlns:mc="http://schemas.openxmlformats.org/markup-compatibility/2006" xmlns:p14="http://schemas.microsoft.com/office/powerpoint/2010/main">
+    <mc:Choice Requires="p14">
       <p:transition spd="slow" p14:dur="800">
         <p14:flythrough/>
       </p:transition>
     </mc:Choice>
-    <mc:Fallback>
+    <mc:Fallback xmlns="">
       <p:transition spd="slow">
         <p:fade/>
       </p:transition>
@@ -5863,13 +5886,13 @@
   <p:clrMapOvr>
     <a:masterClrMapping/>
   </p:clrMapOvr>
-  <mc:AlternateContent xmlns:mc="http://schemas.openxmlformats.org/markup-compatibility/2006">
-    <mc:Choice xmlns:p14="http://schemas.microsoft.com/office/powerpoint/2010/main" Requires="p14">
+  <mc:AlternateContent xmlns:mc="http://schemas.openxmlformats.org/markup-compatibility/2006" xmlns:p14="http://schemas.microsoft.com/office/powerpoint/2010/main">
+    <mc:Choice Requires="p14">
       <p:transition spd="slow" p14:dur="800">
         <p14:flythrough/>
       </p:transition>
     </mc:Choice>
-    <mc:Fallback>
+    <mc:Fallback xmlns="">
       <p:transition spd="slow">
         <p:fade/>
       </p:transition>
@@ -5974,13 +5997,13 @@
   <p:clrMapOvr>
     <a:masterClrMapping/>
   </p:clrMapOvr>
-  <mc:AlternateContent xmlns:mc="http://schemas.openxmlformats.org/markup-compatibility/2006">
-    <mc:Choice xmlns:p14="http://schemas.microsoft.com/office/powerpoint/2010/main" Requires="p14">
+  <mc:AlternateContent xmlns:mc="http://schemas.openxmlformats.org/markup-compatibility/2006" xmlns:p14="http://schemas.microsoft.com/office/powerpoint/2010/main">
+    <mc:Choice Requires="p14">
       <p:transition spd="slow" p14:dur="800">
         <p14:flythrough/>
       </p:transition>
     </mc:Choice>
-    <mc:Fallback>
+    <mc:Fallback xmlns="">
       <p:transition spd="slow">
         <p:fade/>
       </p:transition>
@@ -6085,13 +6108,13 @@
   <p:clrMapOvr>
     <a:masterClrMapping/>
   </p:clrMapOvr>
-  <mc:AlternateContent xmlns:mc="http://schemas.openxmlformats.org/markup-compatibility/2006">
-    <mc:Choice xmlns:p14="http://schemas.microsoft.com/office/powerpoint/2010/main" Requires="p14">
+  <mc:AlternateContent xmlns:mc="http://schemas.openxmlformats.org/markup-compatibility/2006" xmlns:p14="http://schemas.microsoft.com/office/powerpoint/2010/main">
+    <mc:Choice Requires="p14">
       <p:transition spd="slow" p14:dur="800">
         <p14:flythrough/>
       </p:transition>
     </mc:Choice>
-    <mc:Fallback>
+    <mc:Fallback xmlns="">
       <p:transition spd="slow">
         <p:fade/>
       </p:transition>
@@ -6226,13 +6249,13 @@
   <p:clrMapOvr>
     <a:masterClrMapping/>
   </p:clrMapOvr>
-  <mc:AlternateContent xmlns:mc="http://schemas.openxmlformats.org/markup-compatibility/2006">
-    <mc:Choice xmlns:p14="http://schemas.microsoft.com/office/powerpoint/2010/main" Requires="p14">
+  <mc:AlternateContent xmlns:mc="http://schemas.openxmlformats.org/markup-compatibility/2006" xmlns:p14="http://schemas.microsoft.com/office/powerpoint/2010/main">
+    <mc:Choice Requires="p14">
       <p:transition spd="slow" p14:dur="4000">
         <p14:vortex dir="r"/>
       </p:transition>
     </mc:Choice>
-    <mc:Fallback>
+    <mc:Fallback xmlns="">
       <p:transition spd="slow">
         <p:fade/>
       </p:transition>
@@ -6356,13 +6379,13 @@
   <p:clrMapOvr>
     <a:masterClrMapping/>
   </p:clrMapOvr>
-  <mc:AlternateContent xmlns:mc="http://schemas.openxmlformats.org/markup-compatibility/2006">
-    <mc:Choice xmlns:p14="http://schemas.microsoft.com/office/powerpoint/2010/main" Requires="p14">
+  <mc:AlternateContent xmlns:mc="http://schemas.openxmlformats.org/markup-compatibility/2006" xmlns:p14="http://schemas.microsoft.com/office/powerpoint/2010/main">
+    <mc:Choice Requires="p14">
       <p:transition spd="slow" p14:dur="800">
         <p14:flythrough/>
       </p:transition>
     </mc:Choice>
-    <mc:Fallback>
+    <mc:Fallback xmlns="">
       <p:transition spd="slow">
         <p:fade/>
       </p:transition>
@@ -6467,13 +6490,13 @@
   <p:clrMapOvr>
     <a:masterClrMapping/>
   </p:clrMapOvr>
-  <mc:AlternateContent xmlns:mc="http://schemas.openxmlformats.org/markup-compatibility/2006">
-    <mc:Choice xmlns:p14="http://schemas.microsoft.com/office/powerpoint/2010/main" Requires="p14">
+  <mc:AlternateContent xmlns:mc="http://schemas.openxmlformats.org/markup-compatibility/2006" xmlns:p14="http://schemas.microsoft.com/office/powerpoint/2010/main">
+    <mc:Choice Requires="p14">
       <p:transition spd="slow" p14:dur="800">
         <p14:flythrough/>
       </p:transition>
     </mc:Choice>
-    <mc:Fallback>
+    <mc:Fallback xmlns="">
       <p:transition spd="slow">
         <p:fade/>
       </p:transition>
@@ -7180,13 +7203,13 @@
   <p:clrMapOvr>
     <a:masterClrMapping/>
   </p:clrMapOvr>
-  <mc:AlternateContent xmlns:mc="http://schemas.openxmlformats.org/markup-compatibility/2006">
-    <mc:Choice xmlns:p14="http://schemas.microsoft.com/office/powerpoint/2010/main" Requires="p14">
+  <mc:AlternateContent xmlns:mc="http://schemas.openxmlformats.org/markup-compatibility/2006" xmlns:p14="http://schemas.microsoft.com/office/powerpoint/2010/main">
+    <mc:Choice Requires="p14">
       <p:transition spd="slow" p14:dur="800">
         <p14:flythrough/>
       </p:transition>
     </mc:Choice>
-    <mc:Fallback>
+    <mc:Fallback xmlns="">
       <p:transition spd="slow">
         <p:fade/>
       </p:transition>
@@ -7303,13 +7326,13 @@
   <p:clrMapOvr>
     <a:masterClrMapping/>
   </p:clrMapOvr>
-  <mc:AlternateContent xmlns:mc="http://schemas.openxmlformats.org/markup-compatibility/2006">
-    <mc:Choice xmlns:p14="http://schemas.microsoft.com/office/powerpoint/2010/main" Requires="p14">
+  <mc:AlternateContent xmlns:mc="http://schemas.openxmlformats.org/markup-compatibility/2006" xmlns:p14="http://schemas.microsoft.com/office/powerpoint/2010/main">
+    <mc:Choice Requires="p14">
       <p:transition spd="slow" p14:dur="1400">
         <p14:ripple/>
       </p:transition>
     </mc:Choice>
-    <mc:Fallback>
+    <mc:Fallback xmlns="">
       <p:transition spd="slow">
         <p:fade/>
       </p:transition>
@@ -7352,13 +7375,13 @@
   <p:clrMapOvr>
     <a:masterClrMapping/>
   </p:clrMapOvr>
-  <mc:AlternateContent xmlns:mc="http://schemas.openxmlformats.org/markup-compatibility/2006">
-    <mc:Choice xmlns:p14="http://schemas.microsoft.com/office/powerpoint/2010/main" Requires="p14">
+  <mc:AlternateContent xmlns:mc="http://schemas.openxmlformats.org/markup-compatibility/2006" xmlns:p14="http://schemas.microsoft.com/office/powerpoint/2010/main">
+    <mc:Choice Requires="p14">
       <p:transition spd="slow" p14:dur="800">
         <p14:flythrough/>
       </p:transition>
     </mc:Choice>
-    <mc:Fallback>
+    <mc:Fallback xmlns="">
       <p:transition spd="slow">
         <p:fade/>
       </p:transition>
@@ -7477,13 +7500,13 @@
   <p:clrMapOvr>
     <a:masterClrMapping/>
   </p:clrMapOvr>
-  <mc:AlternateContent xmlns:mc="http://schemas.openxmlformats.org/markup-compatibility/2006">
-    <mc:Choice xmlns:p14="http://schemas.microsoft.com/office/powerpoint/2010/main" Requires="p14">
+  <mc:AlternateContent xmlns:mc="http://schemas.openxmlformats.org/markup-compatibility/2006" xmlns:p14="http://schemas.microsoft.com/office/powerpoint/2010/main">
+    <mc:Choice Requires="p14">
       <p:transition spd="slow" p14:dur="800">
         <p14:flythrough/>
       </p:transition>
     </mc:Choice>
-    <mc:Fallback>
+    <mc:Fallback xmlns="">
       <p:transition spd="slow">
         <p:fade/>
       </p:transition>
@@ -7630,13 +7653,13 @@
   <p:clrMapOvr>
     <a:masterClrMapping/>
   </p:clrMapOvr>
-  <mc:AlternateContent xmlns:mc="http://schemas.openxmlformats.org/markup-compatibility/2006">
-    <mc:Choice xmlns:p14="http://schemas.microsoft.com/office/powerpoint/2010/main" Requires="p14">
+  <mc:AlternateContent xmlns:mc="http://schemas.openxmlformats.org/markup-compatibility/2006" xmlns:p14="http://schemas.microsoft.com/office/powerpoint/2010/main">
+    <mc:Choice Requires="p14">
       <p:transition spd="slow" p14:dur="800">
         <p14:flythrough/>
       </p:transition>
     </mc:Choice>
-    <mc:Fallback>
+    <mc:Fallback xmlns="">
       <p:transition spd="slow">
         <p:fade/>
       </p:transition>
@@ -7803,13 +7826,13 @@
   <p:clrMapOvr>
     <a:masterClrMapping/>
   </p:clrMapOvr>
-  <mc:AlternateContent xmlns:mc="http://schemas.openxmlformats.org/markup-compatibility/2006">
-    <mc:Choice xmlns:p14="http://schemas.microsoft.com/office/powerpoint/2010/main" Requires="p14">
+  <mc:AlternateContent xmlns:mc="http://schemas.openxmlformats.org/markup-compatibility/2006" xmlns:p14="http://schemas.microsoft.com/office/powerpoint/2010/main">
+    <mc:Choice Requires="p14">
       <p:transition spd="slow" p14:dur="800">
         <p14:flythrough/>
       </p:transition>
     </mc:Choice>
-    <mc:Fallback>
+    <mc:Fallback xmlns="">
       <p:transition spd="slow">
         <p:fade/>
       </p:transition>
@@ -7914,13 +7937,13 @@
   <p:clrMapOvr>
     <a:masterClrMapping/>
   </p:clrMapOvr>
-  <mc:AlternateContent xmlns:mc="http://schemas.openxmlformats.org/markup-compatibility/2006">
-    <mc:Choice xmlns:p14="http://schemas.microsoft.com/office/powerpoint/2010/main" Requires="p14">
+  <mc:AlternateContent xmlns:mc="http://schemas.openxmlformats.org/markup-compatibility/2006" xmlns:p14="http://schemas.microsoft.com/office/powerpoint/2010/main">
+    <mc:Choice Requires="p14">
       <p:transition spd="slow" p14:dur="800">
         <p14:flythrough/>
       </p:transition>
     </mc:Choice>
-    <mc:Fallback>
+    <mc:Fallback xmlns="">
       <p:transition spd="slow">
         <p:fade/>
       </p:transition>
@@ -8025,13 +8048,13 @@
   <p:clrMapOvr>
     <a:masterClrMapping/>
   </p:clrMapOvr>
-  <mc:AlternateContent xmlns:mc="http://schemas.openxmlformats.org/markup-compatibility/2006">
-    <mc:Choice xmlns:p14="http://schemas.microsoft.com/office/powerpoint/2010/main" Requires="p14">
+  <mc:AlternateContent xmlns:mc="http://schemas.openxmlformats.org/markup-compatibility/2006" xmlns:p14="http://schemas.microsoft.com/office/powerpoint/2010/main">
+    <mc:Choice Requires="p14">
       <p:transition spd="slow" p14:dur="800">
         <p14:flythrough/>
       </p:transition>
     </mc:Choice>
-    <mc:Fallback>
+    <mc:Fallback xmlns="">
       <p:transition spd="slow">
         <p:fade/>
       </p:transition>
@@ -8248,13 +8271,13 @@
   <p:clrMapOvr>
     <a:masterClrMapping/>
   </p:clrMapOvr>
-  <mc:AlternateContent xmlns:mc="http://schemas.openxmlformats.org/markup-compatibility/2006">
-    <mc:Choice xmlns:p14="http://schemas.microsoft.com/office/powerpoint/2010/main" Requires="p14">
+  <mc:AlternateContent xmlns:mc="http://schemas.openxmlformats.org/markup-compatibility/2006" xmlns:p14="http://schemas.microsoft.com/office/powerpoint/2010/main">
+    <mc:Choice Requires="p14">
       <p:transition spd="slow" p14:dur="800">
         <p14:flythrough/>
       </p:transition>
     </mc:Choice>
-    <mc:Fallback>
+    <mc:Fallback xmlns="">
       <p:transition spd="slow">
         <p:fade/>
       </p:transition>
@@ -8359,13 +8382,13 @@
   <p:clrMapOvr>
     <a:masterClrMapping/>
   </p:clrMapOvr>
-  <mc:AlternateContent xmlns:mc="http://schemas.openxmlformats.org/markup-compatibility/2006">
-    <mc:Choice xmlns:p14="http://schemas.microsoft.com/office/powerpoint/2010/main" Requires="p14">
+  <mc:AlternateContent xmlns:mc="http://schemas.openxmlformats.org/markup-compatibility/2006" xmlns:p14="http://schemas.microsoft.com/office/powerpoint/2010/main">
+    <mc:Choice Requires="p14">
       <p:transition spd="slow" p14:dur="800">
         <p14:flythrough/>
       </p:transition>
     </mc:Choice>
-    <mc:Fallback>
+    <mc:Fallback xmlns="">
       <p:transition spd="slow">
         <p:fade/>
       </p:transition>

</xml_diff>